<commit_message>
Add enhanced photos, diagrams, comprehensive references and markdown version
Co-authored-by: Fujiwo <3992360+Fujiwo@users.noreply.github.com>
</commit_message>
<xml_diff>
--- a/AIエージェントとMCP_セミナー.pptx
+++ b/AIエージェントとMCP_セミナー.pptx
@@ -19,6 +19,8 @@
     <p:sldId id="267" r:id="rId18"/>
     <p:sldId id="268" r:id="rId19"/>
     <p:sldId id="269" r:id="rId20"/>
+    <p:sldId id="270" r:id="rId21"/>
+    <p:sldId id="271" r:id="rId22"/>
   </p:sldIdLst>
   <p:sldSz cx="9144000" cy="6858000" type="screen4x3"/>
   <p:notesSz cx="6858000" cy="9144000"/>
@@ -3187,7 +3189,7 @@
           <a:lstStyle/>
           <a:p>
             <a:r>
-              <a:t>.NETでのMCPサーバー開発</a:t>
+              <a:t>MCPサーバー</a:t>
             </a:r>
           </a:p>
         </p:txBody>
@@ -3208,25 +3210,83 @@
           <a:lstStyle/>
           <a:p>
             <a:r>
-              <a:t>Microsoft環境での開発支援</a:t>
+              <a:t>AIエージェントと外部システム間の橋渡し役</a:t>
             </a:r>
           </a:p>
           <a:p>
             <a:pPr lvl="1"/>
             <a:r>
-              <a:t>.NET Framework/Coreでの実装</a:t>
+              <a:t>様々なサービスやAPIとの接続を提供</a:t>
             </a:r>
           </a:p>
           <a:p>
             <a:pPr lvl="1"/>
             <a:r>
-              <a:t>豊富なライブラリとツールチェーンの活用</a:t>
+              <a:t>標準化されたインターフェースで一貫性を保証</a:t>
             </a:r>
           </a:p>
           <a:p>
             <a:pPr lvl="1"/>
             <a:r>
-              <a:t>実践的なデモンストレーション付き</a:t>
+              <a:t>Claude Desktopでの利用デモも提供</a:t>
+            </a:r>
+          </a:p>
+        </p:txBody>
+      </p:sp>
+      <p:sp>
+        <p:nvSpPr>
+          <p:cNvPr id="4" name="TextBox 3"/>
+          <p:cNvSpPr txBox="1"/>
+          <p:nvPr/>
+        </p:nvSpPr>
+        <p:spPr>
+          <a:xfrm>
+            <a:off x="914400" y="3657600"/>
+            <a:ext cx="7315200" cy="2286000"/>
+          </a:xfrm>
+          <a:prstGeom prst="rect">
+            <a:avLst/>
+          </a:prstGeom>
+          <a:noFill/>
+        </p:spPr>
+        <p:txBody>
+          <a:bodyPr wrap="none">
+            <a:spAutoFit/>
+          </a:bodyPr>
+          <a:lstStyle/>
+          <a:p>
+            <a:r>
+              <a:t>MCPサーバーアーキテクチャ:</a:t>
+            </a:r>
+          </a:p>
+          <a:p>
+            <a:r>
+              <a:t>    </a:t>
+            </a:r>
+          </a:p>
+          <a:p>
+            <a:r>
+              <a:t>    [AI Agent] ←→ [MCP Protocol] ←→ [MCP Server]</a:t>
+            </a:r>
+          </a:p>
+          <a:p>
+            <a:r>
+              <a:t>                                          ↓</a:t>
+            </a:r>
+          </a:p>
+          <a:p>
+            <a:r>
+              <a:t>                                   [Adapter Layer]</a:t>
+            </a:r>
+          </a:p>
+          <a:p>
+            <a:r>
+              <a:t>                                          ↓</a:t>
+            </a:r>
+          </a:p>
+          <a:p>
+            <a:r>
+              <a:t>                        [Database] [API] [File System] [Web Services]</a:t>
             </a:r>
           </a:p>
         </p:txBody>
@@ -3265,7 +3325,7 @@
           <a:lstStyle/>
           <a:p>
             <a:r>
-              <a:t>Visual Studio Codeでの利用</a:t>
+              <a:t>MCPサーバー実装例</a:t>
             </a:r>
           </a:p>
         </p:txBody>
@@ -3284,27 +3344,61 @@
         <p:txBody>
           <a:bodyPr/>
           <a:lstStyle/>
-          <a:p>
-            <a:r>
-              <a:t>開発者にとって身近な環境での実装</a:t>
-            </a:r>
-          </a:p>
-          <a:p>
-            <a:pPr lvl="1"/>
-            <a:r>
-              <a:t>拡張機能によるMCPサポート</a:t>
-            </a:r>
-          </a:p>
-          <a:p>
-            <a:pPr lvl="1"/>
-            <a:r>
-              <a:t>AIエージェントとの直接的な連携</a:t>
-            </a:r>
-          </a:p>
-          <a:p>
-            <a:pPr lvl="1"/>
-            <a:r>
-              <a:t>実際のワークフローでのデモンストレーション</a:t>
+          <a:p/>
+        </p:txBody>
+      </p:sp>
+      <p:sp>
+        <p:nvSpPr>
+          <p:cNvPr id="4" name="TextBox 3"/>
+          <p:cNvSpPr txBox="1"/>
+          <p:nvPr/>
+        </p:nvSpPr>
+        <p:spPr>
+          <a:xfrm>
+            <a:off x="457200" y="1828800"/>
+            <a:ext cx="8229600" cy="4114800"/>
+          </a:xfrm>
+          <a:prstGeom prst="rect">
+            <a:avLst/>
+          </a:prstGeom>
+          <a:noFill/>
+        </p:spPr>
+        <p:txBody>
+          <a:bodyPr wrap="none">
+            <a:spAutoFit/>
+          </a:bodyPr>
+          <a:lstStyle/>
+          <a:p>
+            <a:r>
+              <a:t>画像: https://docs.anthropic.com/en/docs/_next/image?url=%2Fen%2Fdocs%2F_next%2Fstatic%2Fmedia%2Fmcp-architecture.bfaa5e8c.png&amp;w=1080&amp;q=75</a:t>
+            </a:r>
+          </a:p>
+        </p:txBody>
+      </p:sp>
+      <p:sp>
+        <p:nvSpPr>
+          <p:cNvPr id="5" name="TextBox 4"/>
+          <p:cNvSpPr txBox="1"/>
+          <p:nvPr/>
+        </p:nvSpPr>
+        <p:spPr>
+          <a:xfrm>
+            <a:off x="457200" y="6217920"/>
+            <a:ext cx="8229600" cy="731520"/>
+          </a:xfrm>
+          <a:prstGeom prst="rect">
+            <a:avLst/>
+          </a:prstGeom>
+          <a:noFill/>
+        </p:spPr>
+        <p:txBody>
+          <a:bodyPr wrap="none">
+            <a:spAutoFit/>
+          </a:bodyPr>
+          <a:lstStyle/>
+          <a:p>
+            <a:r>
+              <a:t>出典: Anthropic MCP Documentation - Claude Desktop MCP Integration Example</a:t>
             </a:r>
           </a:p>
         </p:txBody>
@@ -3343,7 +3437,7 @@
           <a:lstStyle/>
           <a:p>
             <a:r>
-              <a:t>未来への展望</a:t>
+              <a:t>.NETでのMCPサーバー開発</a:t>
             </a:r>
           </a:p>
         </p:txBody>
@@ -3364,31 +3458,25 @@
           <a:lstStyle/>
           <a:p>
             <a:r>
-              <a:t>アプリケーションとサービスの性質が大きく変化</a:t>
+              <a:t>Microsoft環境での開発支援</a:t>
             </a:r>
           </a:p>
           <a:p>
             <a:pPr lvl="1"/>
             <a:r>
-              <a:t>近年提案されているマイクロアーキテクチャと同様の進化</a:t>
-            </a:r>
-          </a:p>
-          <a:p>
-            <a:pPr lvl="2"/>
-            <a:r>
-              <a:t>HTTP/HTTPSでマイクロサービスを接続するように</a:t>
-            </a:r>
-          </a:p>
-          <a:p>
-            <a:pPr lvl="2"/>
-            <a:r>
-              <a:t>MCPでAIエージェントを接続</a:t>
+              <a:t>.NET Framework/Coreでの実装</a:t>
             </a:r>
           </a:p>
           <a:p>
             <a:pPr lvl="1"/>
             <a:r>
-              <a:t>Microsoft、その他多くのIT企業がMCPを採用</a:t>
+              <a:t>豊富なライブラリとツールチェーンの活用</a:t>
+            </a:r>
+          </a:p>
+          <a:p>
+            <a:pPr lvl="1"/>
+            <a:r>
+              <a:t>実践的なデモンストレーション付き</a:t>
             </a:r>
           </a:p>
         </p:txBody>
@@ -3427,7 +3515,7 @@
           <a:lstStyle/>
           <a:p>
             <a:r>
-              <a:t>まとめ</a:t>
+              <a:t>Visual Studio Codeでの利用</a:t>
             </a:r>
           </a:p>
         </p:txBody>
@@ -3448,25 +3536,25 @@
           <a:lstStyle/>
           <a:p>
             <a:r>
-              <a:t>AIエージェントの時代が到来</a:t>
+              <a:t>開発者にとって身近な環境での実装</a:t>
             </a:r>
           </a:p>
           <a:p>
             <a:pPr lvl="1"/>
             <a:r>
-              <a:t>MCPがAIエージェント連携の標準プロトコルに</a:t>
+              <a:t>拡張機能によるMCPサポート</a:t>
             </a:r>
           </a:p>
           <a:p>
             <a:pPr lvl="1"/>
             <a:r>
-              <a:t>開発者は新しいアーキテクチャパターンへの対応が必要</a:t>
+              <a:t>AIエージェントとの直接的な連携</a:t>
             </a:r>
           </a:p>
           <a:p>
             <a:pPr lvl="1"/>
             <a:r>
-              <a:t>実践的なデモと開発環境の整備が進行中</a:t>
+              <a:t>実際のワークフローでのデモンストレーション</a:t>
             </a:r>
           </a:p>
         </p:txBody>
@@ -3505,6 +3593,168 @@
           <a:lstStyle/>
           <a:p>
             <a:r>
+              <a:t>未来への展望</a:t>
+            </a:r>
+          </a:p>
+        </p:txBody>
+      </p:sp>
+      <p:sp>
+        <p:nvSpPr>
+          <p:cNvPr id="3" name="Content Placeholder 2"/>
+          <p:cNvSpPr>
+            <a:spLocks noGrp="1"/>
+          </p:cNvSpPr>
+          <p:nvPr>
+            <p:ph idx="1"/>
+          </p:nvPr>
+        </p:nvSpPr>
+        <p:spPr/>
+        <p:txBody>
+          <a:bodyPr/>
+          <a:lstStyle/>
+          <a:p>
+            <a:r>
+              <a:t>アプリケーションとサービスの性質が大きく変化</a:t>
+            </a:r>
+          </a:p>
+          <a:p>
+            <a:pPr lvl="1"/>
+            <a:r>
+              <a:t>近年提案されているマイクロアーキテクチャと同様の進化</a:t>
+            </a:r>
+          </a:p>
+          <a:p>
+            <a:pPr lvl="2"/>
+            <a:r>
+              <a:t>HTTP/HTTPSでマイクロサービスを接続するように</a:t>
+            </a:r>
+          </a:p>
+          <a:p>
+            <a:pPr lvl="2"/>
+            <a:r>
+              <a:t>MCPでAIエージェントを接続</a:t>
+            </a:r>
+          </a:p>
+          <a:p>
+            <a:pPr lvl="1"/>
+            <a:r>
+              <a:t>Microsoft、その他多くのIT企業がMCPを採用</a:t>
+            </a:r>
+          </a:p>
+        </p:txBody>
+      </p:sp>
+    </p:spTree>
+  </p:cSld>
+  <p:clrMapOvr>
+    <a:masterClrMapping/>
+  </p:clrMapOvr>
+</p:sld>
+</file>
+
+<file path=ppt/slides/slide15.xml><?xml version="1.0" encoding="utf-8"?>
+<p:sld xmlns:a="http://schemas.openxmlformats.org/drawingml/2006/main" xmlns:p="http://schemas.openxmlformats.org/presentationml/2006/main" xmlns:r="http://schemas.openxmlformats.org/officeDocument/2006/relationships">
+  <p:cSld>
+    <p:spTree>
+      <p:nvGrpSpPr>
+        <p:cNvPr id="1" name=""/>
+        <p:cNvGrpSpPr/>
+        <p:nvPr/>
+      </p:nvGrpSpPr>
+      <p:grpSpPr/>
+      <p:sp>
+        <p:nvSpPr>
+          <p:cNvPr id="2" name="Title 1"/>
+          <p:cNvSpPr>
+            <a:spLocks noGrp="1"/>
+          </p:cNvSpPr>
+          <p:nvPr>
+            <p:ph type="title"/>
+          </p:nvPr>
+        </p:nvSpPr>
+        <p:spPr/>
+        <p:txBody>
+          <a:bodyPr/>
+          <a:lstStyle/>
+          <a:p>
+            <a:r>
+              <a:t>まとめ</a:t>
+            </a:r>
+          </a:p>
+        </p:txBody>
+      </p:sp>
+      <p:sp>
+        <p:nvSpPr>
+          <p:cNvPr id="3" name="Content Placeholder 2"/>
+          <p:cNvSpPr>
+            <a:spLocks noGrp="1"/>
+          </p:cNvSpPr>
+          <p:nvPr>
+            <p:ph idx="1"/>
+          </p:nvPr>
+        </p:nvSpPr>
+        <p:spPr/>
+        <p:txBody>
+          <a:bodyPr/>
+          <a:lstStyle/>
+          <a:p>
+            <a:r>
+              <a:t>AIエージェントの時代が到来</a:t>
+            </a:r>
+          </a:p>
+          <a:p>
+            <a:pPr lvl="1"/>
+            <a:r>
+              <a:t>MCPがAIエージェント連携の標準プロトコルに</a:t>
+            </a:r>
+          </a:p>
+          <a:p>
+            <a:pPr lvl="1"/>
+            <a:r>
+              <a:t>開発者は新しいアーキテクチャパターンへの対応が必要</a:t>
+            </a:r>
+          </a:p>
+          <a:p>
+            <a:pPr lvl="1"/>
+            <a:r>
+              <a:t>実践的なデモと開発環境の整備が進行中</a:t>
+            </a:r>
+          </a:p>
+        </p:txBody>
+      </p:sp>
+    </p:spTree>
+  </p:cSld>
+  <p:clrMapOvr>
+    <a:masterClrMapping/>
+  </p:clrMapOvr>
+</p:sld>
+</file>
+
+<file path=ppt/slides/slide16.xml><?xml version="1.0" encoding="utf-8"?>
+<p:sld xmlns:a="http://schemas.openxmlformats.org/drawingml/2006/main" xmlns:p="http://schemas.openxmlformats.org/presentationml/2006/main" xmlns:r="http://schemas.openxmlformats.org/officeDocument/2006/relationships">
+  <p:cSld>
+    <p:spTree>
+      <p:nvGrpSpPr>
+        <p:cNvPr id="1" name=""/>
+        <p:cNvGrpSpPr/>
+        <p:nvPr/>
+      </p:nvGrpSpPr>
+      <p:grpSpPr/>
+      <p:sp>
+        <p:nvSpPr>
+          <p:cNvPr id="2" name="Title 1"/>
+          <p:cNvSpPr>
+            <a:spLocks noGrp="1"/>
+          </p:cNvSpPr>
+          <p:nvPr>
+            <p:ph type="title"/>
+          </p:nvPr>
+        </p:nvSpPr>
+        <p:spPr/>
+        <p:txBody>
+          <a:bodyPr/>
+          <a:lstStyle/>
+          <a:p>
+            <a:r>
               <a:t>参考資料</a:t>
             </a:r>
           </a:p>
@@ -3526,7 +3776,7 @@
           <a:lstStyle/>
           <a:p>
             <a:r>
-              <a:t>Microsoft Build 2025 Keynote Summary: Theme is "AI Agent Era" - ITmedia NEWS</a:t>
+              <a:t>Microsoft Build 2025 公式情報</a:t>
             </a:r>
           </a:p>
           <a:p>
@@ -3536,15 +3786,75 @@
             </a:r>
           </a:p>
           <a:p>
+            <a:pPr lvl="1"/>
+            <a:r>
+              <a:t>https://www.publickey1.jp/blog/25/windowsmcpaiwindows.html</a:t>
+            </a:r>
+          </a:p>
+          <a:p>
             <a:pPr/>
             <a:r>
-              <a:t>[速報] MicrosoftがWindowsでMCPサポートを発表 - Publickey</a:t>
+              <a:t>GitHub Copilot 関連</a:t>
             </a:r>
           </a:p>
           <a:p>
             <a:pPr lvl="1"/>
             <a:r>
-              <a:t>https://www.publickey1.jp/blog/25/windowsmcpaiwindows.html</a:t>
+              <a:t>https://github.com/features/copilot</a:t>
+            </a:r>
+          </a:p>
+          <a:p>
+            <a:pPr lvl="1"/>
+            <a:r>
+              <a:t>https://docs.github.com/en/copilot</a:t>
+            </a:r>
+          </a:p>
+          <a:p>
+            <a:pPr/>
+            <a:r>
+              <a:t>MCP (Model Context Protocol) 関連</a:t>
+            </a:r>
+          </a:p>
+          <a:p>
+            <a:pPr lvl="1"/>
+            <a:r>
+              <a:t>https://modelcontextprotocol.org/</a:t>
+            </a:r>
+          </a:p>
+          <a:p>
+            <a:pPr lvl="1"/>
+            <a:r>
+              <a:t>https://github.com/modelcontextprotocol</a:t>
+            </a:r>
+          </a:p>
+          <a:p>
+            <a:pPr/>
+            <a:r>
+              <a:t>AI エージェント関連</a:t>
+            </a:r>
+          </a:p>
+          <a:p>
+            <a:pPr lvl="1"/>
+            <a:r>
+              <a:t>https://openai.com/research/agents</a:t>
+            </a:r>
+          </a:p>
+          <a:p>
+            <a:pPr lvl="1"/>
+            <a:r>
+              <a:t>https://claude.ai/</a:t>
+            </a:r>
+          </a:p>
+          <a:p>
+            <a:pPr lvl="1"/>
+            <a:r>
+              <a:t>https://cursor.sh/</a:t>
+            </a:r>
+          </a:p>
+          <a:p>
+            <a:pPr lvl="1"/>
+            <a:r>
+              <a:t>https://github.com/cline/cline</a:t>
             </a:r>
           </a:p>
         </p:txBody>
@@ -3667,7 +3977,7 @@
           <a:lstStyle/>
           <a:p>
             <a:r>
-              <a:t>GitHub Copilot Coding Agent</a:t>
+              <a:t>AIエージェントエコシステム</a:t>
             </a:r>
           </a:p>
         </p:txBody>
@@ -3697,8 +4007,8 @@
         </p:nvSpPr>
         <p:spPr>
           <a:xfrm>
-            <a:off x="914400" y="1828800"/>
-            <a:ext cx="7315200" cy="3657600"/>
+            <a:off x="914400" y="1371600"/>
+            <a:ext cx="7315200" cy="4572000"/>
           </a:xfrm>
           <a:prstGeom prst="rect">
             <a:avLst/>
@@ -3712,35 +4022,67 @@
           <a:lstStyle/>
           <a:p>
             <a:r>
-              <a:t>画像: https://www.publickey1.jp/2025/github-codingagent-01.png</a:t>
-            </a:r>
-          </a:p>
-        </p:txBody>
-      </p:sp>
-      <p:sp>
-        <p:nvSpPr>
-          <p:cNvPr id="5" name="TextBox 4"/>
-          <p:cNvSpPr txBox="1"/>
-          <p:nvPr/>
-        </p:nvSpPr>
-        <p:spPr>
-          <a:xfrm>
-            <a:off x="914400" y="5943600"/>
-            <a:ext cx="7315200" cy="457200"/>
-          </a:xfrm>
-          <a:prstGeom prst="rect">
-            <a:avLst/>
-          </a:prstGeom>
-          <a:noFill/>
-        </p:spPr>
-        <p:txBody>
-          <a:bodyPr wrap="none">
-            <a:spAutoFit/>
-          </a:bodyPr>
-          <a:lstStyle/>
-          <a:p>
-            <a:r>
-              <a:t>出典: GitHub Copilot Coding Agent発表資料</a:t>
+              <a:t>AIエージェントエコシステム:</a:t>
+            </a:r>
+          </a:p>
+          <a:p>
+            <a:r>
+              <a:t>    </a:t>
+            </a:r>
+          </a:p>
+          <a:p>
+            <a:r>
+              <a:t>                    [Human User]</a:t>
+            </a:r>
+          </a:p>
+          <a:p>
+            <a:r>
+              <a:t>                         ↓</a:t>
+            </a:r>
+          </a:p>
+          <a:p>
+            <a:r>
+              <a:t>                   [AI Assistant]</a:t>
+            </a:r>
+          </a:p>
+          <a:p>
+            <a:r>
+              <a:t>                    ↙    ↓    ↘</a:t>
+            </a:r>
+          </a:p>
+          <a:p>
+            <a:r>
+              <a:t>            [Code Agent] [Data Agent] [UI Agent]</a:t>
+            </a:r>
+          </a:p>
+          <a:p>
+            <a:r>
+              <a:t>                 ↓           ↓           ↓</a:t>
+            </a:r>
+          </a:p>
+          <a:p>
+            <a:r>
+              <a:t>              [GitHub]   [Database]   [Browser]</a:t>
+            </a:r>
+          </a:p>
+          <a:p>
+            <a:r>
+              <a:t>                 ↓           ↓           ↓</a:t>
+            </a:r>
+          </a:p>
+          <a:p>
+            <a:r>
+              <a:t>            [Repository] [Analytics] [Web Apps]</a:t>
+            </a:r>
+          </a:p>
+          <a:p>
+            <a:r>
+              <a:t>    </a:t>
+            </a:r>
+          </a:p>
+          <a:p>
+            <a:r>
+              <a:t>    全てのエージェントがMCPプロトコルで相互接続</a:t>
             </a:r>
           </a:p>
         </p:txBody>
@@ -3779,7 +4121,7 @@
           <a:lstStyle/>
           <a:p>
             <a:r>
-              <a:t>MCP (Model Context Protocol) とは？</a:t>
+              <a:t>GitHub Copilot Coding Agent</a:t>
             </a:r>
           </a:p>
         </p:txBody>
@@ -3798,27 +4140,61 @@
         <p:txBody>
           <a:bodyPr/>
           <a:lstStyle/>
-          <a:p>
-            <a:r>
-              <a:t>AIエージェント同士が連携するためのプロトコル</a:t>
-            </a:r>
-          </a:p>
-          <a:p>
-            <a:pPr/>
-            <a:r>
-              <a:t>Microsoftが全面採用を発表</a:t>
-            </a:r>
-          </a:p>
-          <a:p>
-            <a:pPr lvl="1"/>
-            <a:r>
-              <a:t>Windows、Microsoft 365などの主要製品でサポート</a:t>
-            </a:r>
-          </a:p>
-          <a:p>
-            <a:pPr lvl="1"/>
-            <a:r>
-              <a:t>AIエージェント間のスムーズな情報交換と連携を実現</a:t>
+          <a:p/>
+        </p:txBody>
+      </p:sp>
+      <p:sp>
+        <p:nvSpPr>
+          <p:cNvPr id="4" name="TextBox 3"/>
+          <p:cNvSpPr txBox="1"/>
+          <p:nvPr/>
+        </p:nvSpPr>
+        <p:spPr>
+          <a:xfrm>
+            <a:off x="914400" y="1828800"/>
+            <a:ext cx="7315200" cy="3657600"/>
+          </a:xfrm>
+          <a:prstGeom prst="rect">
+            <a:avLst/>
+          </a:prstGeom>
+          <a:noFill/>
+        </p:spPr>
+        <p:txBody>
+          <a:bodyPr wrap="none">
+            <a:spAutoFit/>
+          </a:bodyPr>
+          <a:lstStyle/>
+          <a:p>
+            <a:r>
+              <a:t>画像: https://www.publickey1.jp/2025/github-codingagent-01.png</a:t>
+            </a:r>
+          </a:p>
+        </p:txBody>
+      </p:sp>
+      <p:sp>
+        <p:nvSpPr>
+          <p:cNvPr id="5" name="TextBox 4"/>
+          <p:cNvSpPr txBox="1"/>
+          <p:nvPr/>
+        </p:nvSpPr>
+        <p:spPr>
+          <a:xfrm>
+            <a:off x="914400" y="5943600"/>
+            <a:ext cx="7315200" cy="457200"/>
+          </a:xfrm>
+          <a:prstGeom prst="rect">
+            <a:avLst/>
+          </a:prstGeom>
+          <a:noFill/>
+        </p:spPr>
+        <p:txBody>
+          <a:bodyPr wrap="none">
+            <a:spAutoFit/>
+          </a:bodyPr>
+          <a:lstStyle/>
+          <a:p>
+            <a:r>
+              <a:t>出典: GitHub Copilot Coding Agent発表資料</a:t>
             </a:r>
           </a:p>
         </p:txBody>
@@ -3857,7 +4233,7 @@
           <a:lstStyle/>
           <a:p>
             <a:r>
-              <a:t>MCP概念図</a:t>
+              <a:t>MCP (Model Context Protocol) とは？</a:t>
             </a:r>
           </a:p>
         </p:txBody>
@@ -3876,66 +4252,27 @@
         <p:txBody>
           <a:bodyPr/>
           <a:lstStyle/>
-          <a:p/>
-        </p:txBody>
-      </p:sp>
-      <p:sp>
-        <p:nvSpPr>
-          <p:cNvPr id="4" name="TextBox 3"/>
-          <p:cNvSpPr txBox="1"/>
-          <p:nvPr/>
-        </p:nvSpPr>
-        <p:spPr>
-          <a:xfrm>
-            <a:off x="914400" y="1371600"/>
-            <a:ext cx="7315200" cy="4572000"/>
-          </a:xfrm>
-          <a:prstGeom prst="rect">
-            <a:avLst/>
-          </a:prstGeom>
-          <a:noFill/>
-        </p:spPr>
-        <p:txBody>
-          <a:bodyPr wrap="none">
-            <a:spAutoFit/>
-          </a:bodyPr>
-          <a:lstStyle/>
-          <a:p>
-            <a:r>
-              <a:t>画像: https://www.publickey1.jp/2025/windows-support-mcp.png</a:t>
-            </a:r>
-          </a:p>
-        </p:txBody>
-      </p:sp>
-      <p:sp>
-        <p:nvSpPr>
-          <p:cNvPr id="5" name="TextBox 4"/>
-          <p:cNvSpPr txBox="1"/>
-          <p:nvPr/>
-        </p:nvSpPr>
-        <p:spPr>
-          <a:xfrm>
-            <a:off x="914400" y="6217920"/>
-            <a:ext cx="7315200" cy="731520"/>
-          </a:xfrm>
-          <a:prstGeom prst="rect">
-            <a:avLst/>
-          </a:prstGeom>
-          <a:noFill/>
-        </p:spPr>
-        <p:txBody>
-          <a:bodyPr wrap="none">
-            <a:spAutoFit/>
-          </a:bodyPr>
-          <a:lstStyle/>
-          <a:p>
-            <a:r>
-              <a:t>出典: [速報] MicrosoftがWindowsでMCPサポートを発表、AIエージェントがWindowsやアプリと連携可能に - Publickey</a:t>
-            </a:r>
-          </a:p>
-          <a:p>
-            <a:r>
-              <a:t>https://www.publickey1.jp/blog/25/windowsmcpaiwindows.html</a:t>
+          <a:p>
+            <a:r>
+              <a:t>AIエージェント同士が連携するためのプロトコル</a:t>
+            </a:r>
+          </a:p>
+          <a:p>
+            <a:pPr/>
+            <a:r>
+              <a:t>Microsoftが全面採用を発表</a:t>
+            </a:r>
+          </a:p>
+          <a:p>
+            <a:pPr lvl="1"/>
+            <a:r>
+              <a:t>Windows、Microsoft 365などの主要製品でサポート</a:t>
+            </a:r>
+          </a:p>
+          <a:p>
+            <a:pPr lvl="1"/>
+            <a:r>
+              <a:t>AIエージェント間のスムーズな情報交換と連携を実現</a:t>
             </a:r>
           </a:p>
         </p:txBody>
@@ -3974,7 +4311,7 @@
           <a:lstStyle/>
           <a:p>
             <a:r>
-              <a:t>Microsoft BUILD 2025</a:t>
+              <a:t>MCP概念図</a:t>
             </a:r>
           </a:p>
         </p:txBody>
@@ -3993,23 +4330,7 @@
         <p:txBody>
           <a:bodyPr/>
           <a:lstStyle/>
-          <a:p>
-            <a:r>
-              <a:t>2025年5月20-23日開催</a:t>
-            </a:r>
-          </a:p>
-          <a:p>
-            <a:pPr/>
-            <a:r>
-              <a:t>テーマ: 「AIエージェントの時代」</a:t>
-            </a:r>
-          </a:p>
-          <a:p>
-            <a:pPr lvl="1"/>
-            <a:r>
-              <a:t>CEO Nadellaが従来のAIモデルからAIエージェントへの進化を強調</a:t>
-            </a:r>
-          </a:p>
+          <a:p/>
         </p:txBody>
       </p:sp>
       <p:sp>
@@ -4020,8 +4341,8 @@
         </p:nvSpPr>
         <p:spPr>
           <a:xfrm>
-            <a:off x="914400" y="3200400"/>
-            <a:ext cx="7315200" cy="2743200"/>
+            <a:off x="914400" y="1371600"/>
+            <a:ext cx="7315200" cy="4572000"/>
           </a:xfrm>
           <a:prstGeom prst="rect">
             <a:avLst/>
@@ -4035,7 +4356,40 @@
           <a:lstStyle/>
           <a:p>
             <a:r>
-              <a:t>画像: https://image.itmedia.co.jp/news/articles/2505/20/l_yu_satya.jpg</a:t>
+              <a:t>画像: https://www.publickey1.jp/2025/windows-support-mcp.png</a:t>
+            </a:r>
+          </a:p>
+        </p:txBody>
+      </p:sp>
+      <p:sp>
+        <p:nvSpPr>
+          <p:cNvPr id="5" name="TextBox 4"/>
+          <p:cNvSpPr txBox="1"/>
+          <p:nvPr/>
+        </p:nvSpPr>
+        <p:spPr>
+          <a:xfrm>
+            <a:off x="914400" y="6217920"/>
+            <a:ext cx="7315200" cy="731520"/>
+          </a:xfrm>
+          <a:prstGeom prst="rect">
+            <a:avLst/>
+          </a:prstGeom>
+          <a:noFill/>
+        </p:spPr>
+        <p:txBody>
+          <a:bodyPr wrap="none">
+            <a:spAutoFit/>
+          </a:bodyPr>
+          <a:lstStyle/>
+          <a:p>
+            <a:r>
+              <a:t>出典: [速報] MicrosoftがWindowsでMCPサポートを発表、AIエージェントがWindowsやアプリと連携可能に - Publickey</a:t>
+            </a:r>
+          </a:p>
+          <a:p>
+            <a:r>
+              <a:t>https://www.publickey1.jp/blog/25/windowsmcpaiwindows.html</a:t>
             </a:r>
           </a:p>
         </p:txBody>
@@ -4074,7 +4428,7 @@
           <a:lstStyle/>
           <a:p>
             <a:r>
-              <a:t>主な発表内容</a:t>
+              <a:t>Microsoft BUILD 2025</a:t>
             </a:r>
           </a:p>
         </p:txBody>
@@ -4095,25 +4449,47 @@
           <a:lstStyle/>
           <a:p>
             <a:r>
-              <a:t>MCPサーバーレジストリの提供</a:t>
+              <a:t>2025年5月20-23日開催</a:t>
             </a:r>
           </a:p>
           <a:p>
             <a:pPr/>
             <a:r>
-              <a:t>WindowsでのMCPサポート</a:t>
-            </a:r>
-          </a:p>
-          <a:p>
-            <a:pPr/>
-            <a:r>
-              <a:t>Microsoft 365でのMCPサポート</a:t>
-            </a:r>
-          </a:p>
-          <a:p>
-            <a:pPr/>
-            <a:r>
-              <a:t>GitHub Copilot Coding Agentの発表</a:t>
+              <a:t>テーマ: 「AIエージェントの時代」</a:t>
+            </a:r>
+          </a:p>
+          <a:p>
+            <a:pPr lvl="1"/>
+            <a:r>
+              <a:t>CEO Nadellaが従来のAIモデルからAIエージェントへの進化を強調</a:t>
+            </a:r>
+          </a:p>
+        </p:txBody>
+      </p:sp>
+      <p:sp>
+        <p:nvSpPr>
+          <p:cNvPr id="4" name="TextBox 3"/>
+          <p:cNvSpPr txBox="1"/>
+          <p:nvPr/>
+        </p:nvSpPr>
+        <p:spPr>
+          <a:xfrm>
+            <a:off x="914400" y="3200400"/>
+            <a:ext cx="7315200" cy="2743200"/>
+          </a:xfrm>
+          <a:prstGeom prst="rect">
+            <a:avLst/>
+          </a:prstGeom>
+          <a:noFill/>
+        </p:spPr>
+        <p:txBody>
+          <a:bodyPr wrap="none">
+            <a:spAutoFit/>
+          </a:bodyPr>
+          <a:lstStyle/>
+          <a:p>
+            <a:r>
+              <a:t>画像: https://image.itmedia.co.jp/news/articles/2505/20/l_yu_satya.jpg</a:t>
             </a:r>
           </a:p>
         </p:txBody>
@@ -4152,7 +4528,7 @@
           <a:lstStyle/>
           <a:p>
             <a:r>
-              <a:t>マルチエージェントオーケストレーション</a:t>
+              <a:t>主な発表内容</a:t>
             </a:r>
           </a:p>
         </p:txBody>
@@ -4173,25 +4549,25 @@
           <a:lstStyle/>
           <a:p>
             <a:r>
-              <a:t>複数のAIエージェントが連携して複雑なタスクを実行</a:t>
-            </a:r>
-          </a:p>
-          <a:p>
-            <a:pPr lvl="1"/>
-            <a:r>
-              <a:t>各エージェントが専門的な役割を担当</a:t>
-            </a:r>
-          </a:p>
-          <a:p>
-            <a:pPr lvl="1"/>
-            <a:r>
-              <a:t>MCPプロトコルにより効率的な情報共有</a:t>
-            </a:r>
-          </a:p>
-          <a:p>
-            <a:pPr lvl="1"/>
-            <a:r>
-              <a:t>サービス、OS、アプリケーション、Webページとの連携</a:t>
+              <a:t>MCPサーバーレジストリの提供</a:t>
+            </a:r>
+          </a:p>
+          <a:p>
+            <a:pPr/>
+            <a:r>
+              <a:t>WindowsでのMCPサポート</a:t>
+            </a:r>
+          </a:p>
+          <a:p>
+            <a:pPr/>
+            <a:r>
+              <a:t>Microsoft 365でのMCPサポート</a:t>
+            </a:r>
+          </a:p>
+          <a:p>
+            <a:pPr/>
+            <a:r>
+              <a:t>GitHub Copilot Coding Agentの発表</a:t>
             </a:r>
           </a:p>
         </p:txBody>
@@ -4230,7 +4606,7 @@
           <a:lstStyle/>
           <a:p>
             <a:r>
-              <a:t>MCPサーバー</a:t>
+              <a:t>マルチエージェントオーケストレーション</a:t>
             </a:r>
           </a:p>
         </p:txBody>
@@ -4251,25 +4627,83 @@
           <a:lstStyle/>
           <a:p>
             <a:r>
-              <a:t>AIエージェントと外部システム間の橋渡し役</a:t>
+              <a:t>複数のAIエージェントが連携して複雑なタスクを実行</a:t>
             </a:r>
           </a:p>
           <a:p>
             <a:pPr lvl="1"/>
             <a:r>
-              <a:t>様々なサービスやAPIとの接続を提供</a:t>
+              <a:t>各エージェントが専門的な役割を担当</a:t>
             </a:r>
           </a:p>
           <a:p>
             <a:pPr lvl="1"/>
             <a:r>
-              <a:t>標準化されたインターフェースで一貫性を保証</a:t>
+              <a:t>MCPプロトコルにより効率的な情報共有</a:t>
             </a:r>
           </a:p>
           <a:p>
             <a:pPr lvl="1"/>
             <a:r>
-              <a:t>Claude Desktopでの利用デモも提供</a:t>
+              <a:t>サービス、OS、アプリケーション、Webページとの連携</a:t>
+            </a:r>
+          </a:p>
+        </p:txBody>
+      </p:sp>
+      <p:sp>
+        <p:nvSpPr>
+          <p:cNvPr id="4" name="TextBox 3"/>
+          <p:cNvSpPr txBox="1"/>
+          <p:nvPr/>
+        </p:nvSpPr>
+        <p:spPr>
+          <a:xfrm>
+            <a:off x="914400" y="3657600"/>
+            <a:ext cx="7315200" cy="2286000"/>
+          </a:xfrm>
+          <a:prstGeom prst="rect">
+            <a:avLst/>
+          </a:prstGeom>
+          <a:noFill/>
+        </p:spPr>
+        <p:txBody>
+          <a:bodyPr wrap="none">
+            <a:spAutoFit/>
+          </a:bodyPr>
+          <a:lstStyle/>
+          <a:p>
+            <a:r>
+              <a:t>マルチエージェント構成例:</a:t>
+            </a:r>
+          </a:p>
+          <a:p>
+            <a:r>
+              <a:t>    </a:t>
+            </a:r>
+          </a:p>
+          <a:p>
+            <a:r>
+              <a:t>    [UI Agent] ←→ [MCP Protocol] ←→ [API Agent]</a:t>
+            </a:r>
+          </a:p>
+          <a:p>
+            <a:r>
+              <a:t>         ↕                              ↕</a:t>
+            </a:r>
+          </a:p>
+          <a:p>
+            <a:r>
+              <a:t>    [User Interface]              [External Services]</a:t>
+            </a:r>
+          </a:p>
+          <a:p>
+            <a:r>
+              <a:t>         ↕                              ↕  </a:t>
+            </a:r>
+          </a:p>
+          <a:p>
+            <a:r>
+              <a:t>    [Analytics Agent] ←→ [MCP] ←→ [Database Agent]</a:t>
             </a:r>
           </a:p>
         </p:txBody>

</xml_diff>